<commit_message>
Commercial Studies Courses Fixed
</commit_message>
<xml_diff>
--- a/Offline/BusinessManagement/AnodiamManagmentMasterPlan.pptx
+++ b/Offline/BusinessManagement/AnodiamManagmentMasterPlan.pptx
@@ -245,7 +245,7 @@
           <a:p>
             <a:fld id="{EB5091F5-313C-4A81-ACA1-94ED5D4B25D8}" type="datetimeFigureOut">
               <a:rPr lang="en-AU" smtClean="0"/>
-              <a:t>15/06/2023</a:t>
+              <a:t>16/06/2023</a:t>
             </a:fld>
             <a:endParaRPr lang="en-AU"/>
           </a:p>
@@ -415,7 +415,7 @@
           <a:p>
             <a:fld id="{EB5091F5-313C-4A81-ACA1-94ED5D4B25D8}" type="datetimeFigureOut">
               <a:rPr lang="en-AU" smtClean="0"/>
-              <a:t>15/06/2023</a:t>
+              <a:t>16/06/2023</a:t>
             </a:fld>
             <a:endParaRPr lang="en-AU"/>
           </a:p>
@@ -595,7 +595,7 @@
           <a:p>
             <a:fld id="{EB5091F5-313C-4A81-ACA1-94ED5D4B25D8}" type="datetimeFigureOut">
               <a:rPr lang="en-AU" smtClean="0"/>
-              <a:t>15/06/2023</a:t>
+              <a:t>16/06/2023</a:t>
             </a:fld>
             <a:endParaRPr lang="en-AU"/>
           </a:p>
@@ -765,7 +765,7 @@
           <a:p>
             <a:fld id="{EB5091F5-313C-4A81-ACA1-94ED5D4B25D8}" type="datetimeFigureOut">
               <a:rPr lang="en-AU" smtClean="0"/>
-              <a:t>15/06/2023</a:t>
+              <a:t>16/06/2023</a:t>
             </a:fld>
             <a:endParaRPr lang="en-AU"/>
           </a:p>
@@ -1011,7 +1011,7 @@
           <a:p>
             <a:fld id="{EB5091F5-313C-4A81-ACA1-94ED5D4B25D8}" type="datetimeFigureOut">
               <a:rPr lang="en-AU" smtClean="0"/>
-              <a:t>15/06/2023</a:t>
+              <a:t>16/06/2023</a:t>
             </a:fld>
             <a:endParaRPr lang="en-AU"/>
           </a:p>
@@ -1243,7 +1243,7 @@
           <a:p>
             <a:fld id="{EB5091F5-313C-4A81-ACA1-94ED5D4B25D8}" type="datetimeFigureOut">
               <a:rPr lang="en-AU" smtClean="0"/>
-              <a:t>15/06/2023</a:t>
+              <a:t>16/06/2023</a:t>
             </a:fld>
             <a:endParaRPr lang="en-AU"/>
           </a:p>
@@ -1610,7 +1610,7 @@
           <a:p>
             <a:fld id="{EB5091F5-313C-4A81-ACA1-94ED5D4B25D8}" type="datetimeFigureOut">
               <a:rPr lang="en-AU" smtClean="0"/>
-              <a:t>15/06/2023</a:t>
+              <a:t>16/06/2023</a:t>
             </a:fld>
             <a:endParaRPr lang="en-AU"/>
           </a:p>
@@ -1728,7 +1728,7 @@
           <a:p>
             <a:fld id="{EB5091F5-313C-4A81-ACA1-94ED5D4B25D8}" type="datetimeFigureOut">
               <a:rPr lang="en-AU" smtClean="0"/>
-              <a:t>15/06/2023</a:t>
+              <a:t>16/06/2023</a:t>
             </a:fld>
             <a:endParaRPr lang="en-AU"/>
           </a:p>
@@ -1823,7 +1823,7 @@
           <a:p>
             <a:fld id="{EB5091F5-313C-4A81-ACA1-94ED5D4B25D8}" type="datetimeFigureOut">
               <a:rPr lang="en-AU" smtClean="0"/>
-              <a:t>15/06/2023</a:t>
+              <a:t>16/06/2023</a:t>
             </a:fld>
             <a:endParaRPr lang="en-AU"/>
           </a:p>
@@ -2100,7 +2100,7 @@
           <a:p>
             <a:fld id="{EB5091F5-313C-4A81-ACA1-94ED5D4B25D8}" type="datetimeFigureOut">
               <a:rPr lang="en-AU" smtClean="0"/>
-              <a:t>15/06/2023</a:t>
+              <a:t>16/06/2023</a:t>
             </a:fld>
             <a:endParaRPr lang="en-AU"/>
           </a:p>
@@ -2353,7 +2353,7 @@
           <a:p>
             <a:fld id="{EB5091F5-313C-4A81-ACA1-94ED5D4B25D8}" type="datetimeFigureOut">
               <a:rPr lang="en-AU" smtClean="0"/>
-              <a:t>15/06/2023</a:t>
+              <a:t>16/06/2023</a:t>
             </a:fld>
             <a:endParaRPr lang="en-AU"/>
           </a:p>
@@ -2566,7 +2566,7 @@
           <a:p>
             <a:fld id="{EB5091F5-313C-4A81-ACA1-94ED5D4B25D8}" type="datetimeFigureOut">
               <a:rPr lang="en-AU" smtClean="0"/>
-              <a:t>15/06/2023</a:t>
+              <a:t>16/06/2023</a:t>
             </a:fld>
             <a:endParaRPr lang="en-AU"/>
           </a:p>
@@ -3179,13 +3179,7 @@
               <a:rPr lang="en-US" dirty="0" smtClean="0">
                 <a:latin typeface="Oxygen" panose="02000503000000000000" pitchFamily="2" charset="0"/>
               </a:rPr>
-              <a:t>IIT JEE &amp; </a:t>
-            </a:r>
-            <a:r>
-              <a:rPr lang="en-US" dirty="0" smtClean="0">
-                <a:latin typeface="Oxygen" panose="02000503000000000000" pitchFamily="2" charset="0"/>
-              </a:rPr>
-              <a:t>NEET</a:t>
+              <a:t>IIT JEE &amp; NEET</a:t>
             </a:r>
           </a:p>
           <a:p>
@@ -3214,9 +3208,6 @@
               </a:rPr>
               <a:t>)</a:t>
             </a:r>
-            <a:endParaRPr lang="en-US" dirty="0" smtClean="0">
-              <a:latin typeface="Oxygen" panose="02000503000000000000" pitchFamily="2" charset="0"/>
-            </a:endParaRPr>
           </a:p>
           <a:p>
             <a:pPr marL="342900" indent="-342900">
@@ -3232,9 +3223,6 @@
               </a:rPr>
               <a:t>Professional Courses &amp; Grooming</a:t>
             </a:r>
-            <a:endParaRPr lang="en-US" dirty="0" smtClean="0">
-              <a:latin typeface="Oxygen" panose="02000503000000000000" pitchFamily="2" charset="0"/>
-            </a:endParaRPr>
           </a:p>
           <a:p>
             <a:pPr marL="342900" indent="-342900">
@@ -3250,9 +3238,6 @@
               </a:rPr>
               <a:t>Co Curricular</a:t>
             </a:r>
-            <a:endParaRPr lang="en-US" dirty="0" smtClean="0">
-              <a:latin typeface="Oxygen" panose="02000503000000000000" pitchFamily="2" charset="0"/>
-            </a:endParaRPr>
           </a:p>
         </p:txBody>
       </p:sp>
@@ -3285,7 +3270,7 @@
           <p:cNvPr id="19" name="Rectangle 18">
             <a:extLst>
               <a:ext uri="{FF2B5EF4-FFF2-40B4-BE49-F238E27FC236}">
-                <a16:creationId xmlns="" xmlns:a16="http://schemas.microsoft.com/office/drawing/2014/main" id="{907BEB2A-D93E-46CB-95DF-04E16F0D1C0C}"/>
+                <a16:creationId xmlns:a16="http://schemas.microsoft.com/office/drawing/2014/main" xmlns="" id="{907BEB2A-D93E-46CB-95DF-04E16F0D1C0C}"/>
               </a:ext>
             </a:extLst>
           </p:cNvPr>
@@ -3365,6 +3350,13 @@
   <p:clrMapOvr>
     <a:masterClrMapping/>
   </p:clrMapOvr>
+  <p:timing>
+    <p:tnLst>
+      <p:par>
+        <p:cTn id="1" dur="indefinite" restart="never" nodeType="tmRoot"/>
+      </p:par>
+    </p:tnLst>
+  </p:timing>
 </p:sld>
 </file>
 
@@ -3617,17 +3609,8 @@
               <a:rPr lang="en-US" dirty="0" smtClean="0">
                 <a:latin typeface="Oxygen" panose="02000503000000000000" pitchFamily="2" charset="0"/>
               </a:rPr>
-              <a:t>Enroll Students &amp; </a:t>
-            </a:r>
-            <a:r>
-              <a:rPr lang="en-US" dirty="0" smtClean="0">
-                <a:latin typeface="Oxygen" panose="02000503000000000000" pitchFamily="2" charset="0"/>
-              </a:rPr>
-              <a:t>Teach</a:t>
-            </a:r>
-            <a:endParaRPr lang="en-US" dirty="0" smtClean="0">
-              <a:latin typeface="Oxygen" panose="02000503000000000000" pitchFamily="2" charset="0"/>
-            </a:endParaRPr>
+              <a:t>Enroll Students &amp; Teach</a:t>
+            </a:r>
           </a:p>
           <a:p>
             <a:pPr marL="342900" indent="-342900">
@@ -3678,7 +3661,7 @@
           <p:cNvPr id="12" name="Rectangle 11">
             <a:extLst>
               <a:ext uri="{FF2B5EF4-FFF2-40B4-BE49-F238E27FC236}">
-                <a16:creationId xmlns="" xmlns:a16="http://schemas.microsoft.com/office/drawing/2014/main" id="{907BEB2A-D93E-46CB-95DF-04E16F0D1C0C}"/>
+                <a16:creationId xmlns:a16="http://schemas.microsoft.com/office/drawing/2014/main" xmlns="" id="{907BEB2A-D93E-46CB-95DF-04E16F0D1C0C}"/>
               </a:ext>
             </a:extLst>
           </p:cNvPr>
@@ -3758,6 +3741,13 @@
   <p:clrMapOvr>
     <a:masterClrMapping/>
   </p:clrMapOvr>
+  <p:timing>
+    <p:tnLst>
+      <p:par>
+        <p:cTn id="1" dur="indefinite" restart="never" nodeType="tmRoot"/>
+      </p:par>
+    </p:tnLst>
+  </p:timing>
 </p:sld>
 </file>
 
@@ -3888,97 +3878,8 @@
                 </a:solidFill>
                 <a:latin typeface="Oxygen" panose="02000503000000000000" pitchFamily="2" charset="0"/>
               </a:rPr>
-              <a:t>, IoT &amp; </a:t>
-            </a:r>
-            <a:r>
-              <a:rPr lang="en-US" sz="3200" b="1" dirty="0">
-                <a:solidFill>
-                  <a:srgbClr val="FF8C52"/>
-                </a:solidFill>
-                <a:latin typeface="Oxygen" panose="02000503000000000000" pitchFamily="2" charset="0"/>
-              </a:rPr>
-              <a:t>AI</a:t>
-            </a:r>
-            <a:endParaRPr lang="en-US" sz="3200" b="1" dirty="0">
-              <a:solidFill>
-                <a:srgbClr val="FF8C52"/>
-              </a:solidFill>
-              <a:latin typeface="Oxygen" panose="02000503000000000000" pitchFamily="2" charset="0"/>
-            </a:endParaRPr>
-          </a:p>
-        </p:txBody>
-      </p:sp>
-      <p:sp>
-        <p:nvSpPr>
-          <p:cNvPr id="7" name="TextBox 6"/>
-          <p:cNvSpPr txBox="1"/>
-          <p:nvPr/>
-        </p:nvSpPr>
-        <p:spPr>
-          <a:xfrm>
-            <a:off x="5695707" y="1400909"/>
-            <a:ext cx="5323391" cy="1113575"/>
-          </a:xfrm>
-          <a:prstGeom prst="rect">
-            <a:avLst/>
-          </a:prstGeom>
-          <a:noFill/>
-        </p:spPr>
-        <p:txBody>
-          <a:bodyPr wrap="square" rtlCol="0">
-            <a:spAutoFit/>
-          </a:bodyPr>
-          <a:lstStyle/>
-          <a:p>
-            <a:pPr marL="342900" indent="-342900">
-              <a:lnSpc>
-                <a:spcPct val="200000"/>
-              </a:lnSpc>
-              <a:buFont typeface="Wingdings" panose="05000000000000000000" pitchFamily="2" charset="2"/>
-              <a:buChar char="v"/>
-            </a:pPr>
-            <a:r>
-              <a:rPr lang="en-US" dirty="0" smtClean="0">
-                <a:latin typeface="Oxygen" panose="02000503000000000000" pitchFamily="2" charset="0"/>
-              </a:rPr>
-              <a:t> </a:t>
-            </a:r>
-            <a:r>
-              <a:rPr lang="en-US" dirty="0" err="1" smtClean="0">
-                <a:latin typeface="Oxygen" panose="02000503000000000000" pitchFamily="2" charset="0"/>
-              </a:rPr>
-              <a:t>dfv</a:t>
-            </a:r>
-            <a:r>
-              <a:rPr lang="en-US" dirty="0" smtClean="0">
-                <a:latin typeface="Oxygen" panose="02000503000000000000" pitchFamily="2" charset="0"/>
-              </a:rPr>
-              <a:t> </a:t>
-            </a:r>
-            <a:r>
-              <a:rPr lang="en-US" dirty="0" err="1" smtClean="0">
-                <a:latin typeface="Oxygen" panose="02000503000000000000" pitchFamily="2" charset="0"/>
-              </a:rPr>
-              <a:t>dfv</a:t>
-            </a:r>
-            <a:r>
-              <a:rPr lang="en-US" dirty="0" smtClean="0">
-                <a:latin typeface="Oxygen" panose="02000503000000000000" pitchFamily="2" charset="0"/>
-              </a:rPr>
-              <a:t> co curricular</a:t>
-            </a:r>
-          </a:p>
-          <a:p>
-            <a:pPr marL="342900" indent="-342900">
-              <a:lnSpc>
-                <a:spcPct val="200000"/>
-              </a:lnSpc>
-              <a:buFont typeface="Wingdings" panose="05000000000000000000" pitchFamily="2" charset="2"/>
-              <a:buChar char="v"/>
-            </a:pPr>
-            <a:endParaRPr lang="en-AU" dirty="0">
-              <a:latin typeface="Oxygen" panose="02000503000000000000" pitchFamily="2" charset="0"/>
-            </a:endParaRPr>
+              <a:t>, IoT &amp; AI</a:t>
+            </a:r>
           </a:p>
         </p:txBody>
       </p:sp>
@@ -4011,7 +3912,7 @@
           <p:cNvPr id="10" name="Rectangle 9">
             <a:extLst>
               <a:ext uri="{FF2B5EF4-FFF2-40B4-BE49-F238E27FC236}">
-                <a16:creationId xmlns="" xmlns:a16="http://schemas.microsoft.com/office/drawing/2014/main" id="{907BEB2A-D93E-46CB-95DF-04E16F0D1C0C}"/>
+                <a16:creationId xmlns:a16="http://schemas.microsoft.com/office/drawing/2014/main" xmlns="" id="{907BEB2A-D93E-46CB-95DF-04E16F0D1C0C}"/>
               </a:ext>
             </a:extLst>
           </p:cNvPr>
@@ -4091,6 +3992,13 @@
   <p:clrMapOvr>
     <a:masterClrMapping/>
   </p:clrMapOvr>
+  <p:timing>
+    <p:tnLst>
+      <p:par>
+        <p:cTn id="1" dur="indefinite" restart="never" nodeType="tmRoot"/>
+      </p:par>
+    </p:tnLst>
+  </p:timing>
 </p:sld>
 </file>
 

</xml_diff>

<commit_message>
Management Master Plan updated
</commit_message>
<xml_diff>
--- a/Offline/BusinessManagement/AnodiamManagmentMasterPlan.pptx
+++ b/Offline/BusinessManagement/AnodiamManagmentMasterPlan.pptx
@@ -7,6 +7,7 @@
   <p:sldIdLst>
     <p:sldId id="256" r:id="rId2"/>
     <p:sldId id="257" r:id="rId3"/>
+    <p:sldId id="258" r:id="rId4"/>
   </p:sldIdLst>
   <p:sldSz cx="12192000" cy="6858000"/>
   <p:notesSz cx="6858000" cy="9144000"/>
@@ -244,7 +245,7 @@
           <a:p>
             <a:fld id="{EB5091F5-313C-4A81-ACA1-94ED5D4B25D8}" type="datetimeFigureOut">
               <a:rPr lang="en-AU" smtClean="0"/>
-              <a:t>21/06/2023</a:t>
+              <a:t>23/06/2023</a:t>
             </a:fld>
             <a:endParaRPr lang="en-AU"/>
           </a:p>
@@ -414,7 +415,7 @@
           <a:p>
             <a:fld id="{EB5091F5-313C-4A81-ACA1-94ED5D4B25D8}" type="datetimeFigureOut">
               <a:rPr lang="en-AU" smtClean="0"/>
-              <a:t>21/06/2023</a:t>
+              <a:t>23/06/2023</a:t>
             </a:fld>
             <a:endParaRPr lang="en-AU"/>
           </a:p>
@@ -594,7 +595,7 @@
           <a:p>
             <a:fld id="{EB5091F5-313C-4A81-ACA1-94ED5D4B25D8}" type="datetimeFigureOut">
               <a:rPr lang="en-AU" smtClean="0"/>
-              <a:t>21/06/2023</a:t>
+              <a:t>23/06/2023</a:t>
             </a:fld>
             <a:endParaRPr lang="en-AU"/>
           </a:p>
@@ -764,7 +765,7 @@
           <a:p>
             <a:fld id="{EB5091F5-313C-4A81-ACA1-94ED5D4B25D8}" type="datetimeFigureOut">
               <a:rPr lang="en-AU" smtClean="0"/>
-              <a:t>21/06/2023</a:t>
+              <a:t>23/06/2023</a:t>
             </a:fld>
             <a:endParaRPr lang="en-AU"/>
           </a:p>
@@ -1010,7 +1011,7 @@
           <a:p>
             <a:fld id="{EB5091F5-313C-4A81-ACA1-94ED5D4B25D8}" type="datetimeFigureOut">
               <a:rPr lang="en-AU" smtClean="0"/>
-              <a:t>21/06/2023</a:t>
+              <a:t>23/06/2023</a:t>
             </a:fld>
             <a:endParaRPr lang="en-AU"/>
           </a:p>
@@ -1242,7 +1243,7 @@
           <a:p>
             <a:fld id="{EB5091F5-313C-4A81-ACA1-94ED5D4B25D8}" type="datetimeFigureOut">
               <a:rPr lang="en-AU" smtClean="0"/>
-              <a:t>21/06/2023</a:t>
+              <a:t>23/06/2023</a:t>
             </a:fld>
             <a:endParaRPr lang="en-AU"/>
           </a:p>
@@ -1609,7 +1610,7 @@
           <a:p>
             <a:fld id="{EB5091F5-313C-4A81-ACA1-94ED5D4B25D8}" type="datetimeFigureOut">
               <a:rPr lang="en-AU" smtClean="0"/>
-              <a:t>21/06/2023</a:t>
+              <a:t>23/06/2023</a:t>
             </a:fld>
             <a:endParaRPr lang="en-AU"/>
           </a:p>
@@ -1727,7 +1728,7 @@
           <a:p>
             <a:fld id="{EB5091F5-313C-4A81-ACA1-94ED5D4B25D8}" type="datetimeFigureOut">
               <a:rPr lang="en-AU" smtClean="0"/>
-              <a:t>21/06/2023</a:t>
+              <a:t>23/06/2023</a:t>
             </a:fld>
             <a:endParaRPr lang="en-AU"/>
           </a:p>
@@ -1822,7 +1823,7 @@
           <a:p>
             <a:fld id="{EB5091F5-313C-4A81-ACA1-94ED5D4B25D8}" type="datetimeFigureOut">
               <a:rPr lang="en-AU" smtClean="0"/>
-              <a:t>21/06/2023</a:t>
+              <a:t>23/06/2023</a:t>
             </a:fld>
             <a:endParaRPr lang="en-AU"/>
           </a:p>
@@ -2099,7 +2100,7 @@
           <a:p>
             <a:fld id="{EB5091F5-313C-4A81-ACA1-94ED5D4B25D8}" type="datetimeFigureOut">
               <a:rPr lang="en-AU" smtClean="0"/>
-              <a:t>21/06/2023</a:t>
+              <a:t>23/06/2023</a:t>
             </a:fld>
             <a:endParaRPr lang="en-AU"/>
           </a:p>
@@ -2352,7 +2353,7 @@
           <a:p>
             <a:fld id="{EB5091F5-313C-4A81-ACA1-94ED5D4B25D8}" type="datetimeFigureOut">
               <a:rPr lang="en-AU" smtClean="0"/>
-              <a:t>21/06/2023</a:t>
+              <a:t>23/06/2023</a:t>
             </a:fld>
             <a:endParaRPr lang="en-AU"/>
           </a:p>
@@ -2565,7 +2566,7 @@
           <a:p>
             <a:fld id="{EB5091F5-313C-4A81-ACA1-94ED5D4B25D8}" type="datetimeFigureOut">
               <a:rPr lang="en-AU" smtClean="0"/>
-              <a:t>21/06/2023</a:t>
+              <a:t>23/06/2023</a:t>
             </a:fld>
             <a:endParaRPr lang="en-AU"/>
           </a:p>
@@ -3090,7 +3091,7 @@
         </p:nvSpPr>
         <p:spPr>
           <a:xfrm>
-            <a:off x="5742006" y="1317325"/>
+            <a:off x="5531694" y="1317325"/>
             <a:ext cx="5450250" cy="4524315"/>
           </a:xfrm>
           <a:prstGeom prst="rect">
@@ -3112,29 +3113,14 @@
               <a:buChar char="v"/>
             </a:pPr>
             <a:r>
-              <a:rPr lang="en-US" dirty="0" smtClean="0">
+              <a:rPr lang="en-US" b="1" dirty="0" smtClean="0">
                 <a:solidFill>
                   <a:srgbClr val="C00000"/>
                 </a:solidFill>
                 <a:latin typeface="Oxygen" panose="02000503000000000000" pitchFamily="2" charset="0"/>
               </a:rPr>
-              <a:t>IT, IoT &amp; </a:t>
-            </a:r>
-            <a:r>
-              <a:rPr lang="en-US" dirty="0" smtClean="0">
-                <a:solidFill>
-                  <a:srgbClr val="C00000"/>
-                </a:solidFill>
-                <a:latin typeface="Oxygen" panose="02000503000000000000" pitchFamily="2" charset="0"/>
-              </a:rPr>
-              <a:t>AI</a:t>
-            </a:r>
-            <a:endParaRPr lang="en-US" dirty="0" smtClean="0">
-              <a:solidFill>
-                <a:srgbClr val="C00000"/>
-              </a:solidFill>
-              <a:latin typeface="Oxygen" panose="02000503000000000000" pitchFamily="2" charset="0"/>
-            </a:endParaRPr>
+              <a:t>IT, IoT &amp; AI</a:t>
+            </a:r>
           </a:p>
           <a:p>
             <a:pPr marL="342900" indent="-342900">
@@ -3145,7 +3131,7 @@
               <a:buChar char="v"/>
             </a:pPr>
             <a:r>
-              <a:rPr lang="en-US" dirty="0" smtClean="0">
+              <a:rPr lang="en-US" b="1" dirty="0" smtClean="0">
                 <a:solidFill>
                   <a:srgbClr val="C00000"/>
                 </a:solidFill>
@@ -3163,7 +3149,7 @@
               <a:buChar char="v"/>
             </a:pPr>
             <a:r>
-              <a:rPr lang="en-US" dirty="0" smtClean="0">
+              <a:rPr lang="en-US" b="1" dirty="0" smtClean="0">
                 <a:solidFill>
                   <a:srgbClr val="C00000"/>
                 </a:solidFill>
@@ -3172,7 +3158,7 @@
               <a:t>Job Ready </a:t>
             </a:r>
             <a:r>
-              <a:rPr lang="en-US" dirty="0">
+              <a:rPr lang="en-US" b="1" dirty="0">
                 <a:solidFill>
                   <a:srgbClr val="C00000"/>
                 </a:solidFill>
@@ -3181,7 +3167,7 @@
               <a:t>(</a:t>
             </a:r>
             <a:r>
-              <a:rPr lang="en-US" dirty="0" smtClean="0">
+              <a:rPr lang="en-US" b="1" dirty="0" smtClean="0">
                 <a:solidFill>
                   <a:srgbClr val="C00000"/>
                 </a:solidFill>
@@ -3189,7 +3175,7 @@
               </a:rPr>
               <a:t>Sales, English, Tally, MS Office)</a:t>
             </a:r>
-            <a:endParaRPr lang="en-AU" dirty="0" smtClean="0">
+            <a:endParaRPr lang="en-AU" b="1" dirty="0" smtClean="0">
               <a:solidFill>
                 <a:srgbClr val="C00000"/>
               </a:solidFill>
@@ -3205,15 +3191,13 @@
               <a:buChar char="v"/>
             </a:pPr>
             <a:r>
-              <a:rPr lang="en-US" dirty="0" smtClean="0">
-                <a:solidFill>
-                  <a:schemeClr val="accent2">
-                    <a:lumMod val="75000"/>
-                  </a:schemeClr>
+              <a:rPr lang="en-US" b="1" dirty="0">
+                <a:solidFill>
+                  <a:srgbClr val="C00000"/>
                 </a:solidFill>
                 <a:latin typeface="Oxygen" panose="02000503000000000000" pitchFamily="2" charset="0"/>
               </a:rPr>
-              <a:t>IIT JEE &amp; NEET</a:t>
+              <a:t>Professional Courses &amp; Grooming</a:t>
             </a:r>
           </a:p>
           <a:p>
@@ -3225,7 +3209,7 @@
               <a:buChar char="v"/>
             </a:pPr>
             <a:r>
-              <a:rPr lang="en-US" dirty="0">
+              <a:rPr lang="en-US" b="1" dirty="0" smtClean="0">
                 <a:solidFill>
                   <a:schemeClr val="accent2">
                     <a:lumMod val="75000"/>
@@ -3233,7 +3217,18 @@
                 </a:solidFill>
                 <a:latin typeface="Oxygen" panose="02000503000000000000" pitchFamily="2" charset="0"/>
               </a:rPr>
-              <a:t>VIII to XII Science &amp; Arts</a:t>
+              <a:t>IIT </a:t>
+            </a:r>
+            <a:r>
+              <a:rPr lang="en-US" b="1" dirty="0" smtClean="0">
+                <a:solidFill>
+                  <a:schemeClr val="accent2">
+                    <a:lumMod val="75000"/>
+                  </a:schemeClr>
+                </a:solidFill>
+                <a:latin typeface="Oxygen" panose="02000503000000000000" pitchFamily="2" charset="0"/>
+              </a:rPr>
+              <a:t>JEE &amp; NEET</a:t>
             </a:r>
           </a:p>
           <a:p>
@@ -3245,15 +3240,15 @@
               <a:buChar char="v"/>
             </a:pPr>
             <a:r>
-              <a:rPr lang="en-US" dirty="0">
-                <a:solidFill>
-                  <a:schemeClr val="bg1">
-                    <a:lumMod val="50000"/>
+              <a:rPr lang="en-US" b="1" dirty="0">
+                <a:solidFill>
+                  <a:schemeClr val="accent2">
+                    <a:lumMod val="75000"/>
                   </a:schemeClr>
                 </a:solidFill>
                 <a:latin typeface="Oxygen" panose="02000503000000000000" pitchFamily="2" charset="0"/>
               </a:rPr>
-              <a:t>Professional Courses &amp; Grooming</a:t>
+              <a:t>VIII to XII Science &amp; Arts</a:t>
             </a:r>
           </a:p>
           <a:p>
@@ -3265,7 +3260,7 @@
               <a:buChar char="v"/>
             </a:pPr>
             <a:r>
-              <a:rPr lang="en-US" dirty="0" smtClean="0">
+              <a:rPr lang="en-US" b="1" dirty="0" smtClean="0">
                 <a:solidFill>
                   <a:schemeClr val="bg1">
                     <a:lumMod val="50000"/>
@@ -3276,7 +3271,7 @@
               <a:t>Competitive </a:t>
             </a:r>
             <a:r>
-              <a:rPr lang="en-US" dirty="0" smtClean="0">
+              <a:rPr lang="en-US" b="1" dirty="0" smtClean="0">
                 <a:solidFill>
                   <a:schemeClr val="bg1">
                     <a:lumMod val="50000"/>
@@ -3296,7 +3291,7 @@
               <a:buChar char="v"/>
             </a:pPr>
             <a:r>
-              <a:rPr lang="en-US" dirty="0" smtClean="0">
+              <a:rPr lang="en-US" b="1" dirty="0" smtClean="0">
                 <a:solidFill>
                   <a:schemeClr val="bg1">
                     <a:lumMod val="50000"/>
@@ -3304,18 +3299,7 @@
                 </a:solidFill>
                 <a:latin typeface="Oxygen" panose="02000503000000000000" pitchFamily="2" charset="0"/>
               </a:rPr>
-              <a:t>Co </a:t>
-            </a:r>
-            <a:r>
-              <a:rPr lang="en-US" dirty="0" smtClean="0">
-                <a:solidFill>
-                  <a:schemeClr val="bg1">
-                    <a:lumMod val="50000"/>
-                  </a:schemeClr>
-                </a:solidFill>
-                <a:latin typeface="Oxygen" panose="02000503000000000000" pitchFamily="2" charset="0"/>
-              </a:rPr>
-              <a:t>Curricular</a:t>
+              <a:t>Co Curricular</a:t>
             </a:r>
           </a:p>
         </p:txBody>
@@ -3349,7 +3333,7 @@
           <p:cNvPr id="19" name="Rectangle 18">
             <a:extLst>
               <a:ext uri="{FF2B5EF4-FFF2-40B4-BE49-F238E27FC236}">
-                <a16:creationId xmlns:a16="http://schemas.microsoft.com/office/drawing/2014/main" xmlns="" id="{907BEB2A-D93E-46CB-95DF-04E16F0D1C0C}"/>
+                <a16:creationId xmlns="" xmlns:a16="http://schemas.microsoft.com/office/drawing/2014/main" id="{907BEB2A-D93E-46CB-95DF-04E16F0D1C0C}"/>
               </a:ext>
             </a:extLst>
           </p:cNvPr>
@@ -3568,158 +3552,6 @@
           </a:p>
         </p:txBody>
       </p:sp>
-      <p:sp>
-        <p:nvSpPr>
-          <p:cNvPr id="7" name="TextBox 6"/>
-          <p:cNvSpPr txBox="1"/>
-          <p:nvPr/>
-        </p:nvSpPr>
-        <p:spPr>
-          <a:xfrm>
-            <a:off x="5695707" y="1400909"/>
-            <a:ext cx="5323391" cy="3970318"/>
-          </a:xfrm>
-          <a:prstGeom prst="rect">
-            <a:avLst/>
-          </a:prstGeom>
-          <a:noFill/>
-        </p:spPr>
-        <p:txBody>
-          <a:bodyPr wrap="square" rtlCol="0">
-            <a:spAutoFit/>
-          </a:bodyPr>
-          <a:lstStyle/>
-          <a:p>
-            <a:pPr marL="342900" indent="-342900">
-              <a:lnSpc>
-                <a:spcPct val="200000"/>
-              </a:lnSpc>
-              <a:buFont typeface="Wingdings" panose="05000000000000000000" pitchFamily="2" charset="2"/>
-              <a:buChar char="v"/>
-            </a:pPr>
-            <a:r>
-              <a:rPr lang="en-US" dirty="0" smtClean="0">
-                <a:latin typeface="Oxygen" panose="02000503000000000000" pitchFamily="2" charset="0"/>
-              </a:rPr>
-              <a:t>Decide Subjects, Boards/Unis, Classes</a:t>
-            </a:r>
-          </a:p>
-          <a:p>
-            <a:pPr marL="342900" indent="-342900">
-              <a:lnSpc>
-                <a:spcPct val="200000"/>
-              </a:lnSpc>
-              <a:buFont typeface="Wingdings" panose="05000000000000000000" pitchFamily="2" charset="2"/>
-              <a:buChar char="v"/>
-            </a:pPr>
-            <a:r>
-              <a:rPr lang="en-US" dirty="0" smtClean="0">
-                <a:latin typeface="Oxygen" panose="02000503000000000000" pitchFamily="2" charset="0"/>
-              </a:rPr>
-              <a:t>Ensure Core Faculty is </a:t>
-            </a:r>
-            <a:r>
-              <a:rPr lang="en-US" dirty="0" smtClean="0">
-                <a:latin typeface="Oxygen" panose="02000503000000000000" pitchFamily="2" charset="0"/>
-              </a:rPr>
-              <a:t>Ready</a:t>
-            </a:r>
-            <a:endParaRPr lang="en-US" dirty="0" smtClean="0">
-              <a:latin typeface="Oxygen" panose="02000503000000000000" pitchFamily="2" charset="0"/>
-            </a:endParaRPr>
-          </a:p>
-          <a:p>
-            <a:pPr marL="342900" indent="-342900">
-              <a:lnSpc>
-                <a:spcPct val="200000"/>
-              </a:lnSpc>
-              <a:buFont typeface="Wingdings" panose="05000000000000000000" pitchFamily="2" charset="2"/>
-              <a:buChar char="v"/>
-            </a:pPr>
-            <a:r>
-              <a:rPr lang="en-US" dirty="0" smtClean="0">
-                <a:latin typeface="Oxygen" panose="02000503000000000000" pitchFamily="2" charset="0"/>
-              </a:rPr>
-              <a:t>Procure Syllabus / Design </a:t>
-            </a:r>
-            <a:r>
-              <a:rPr lang="en-US" dirty="0">
-                <a:latin typeface="Oxygen" panose="02000503000000000000" pitchFamily="2" charset="0"/>
-              </a:rPr>
-              <a:t>C</a:t>
-            </a:r>
-            <a:r>
-              <a:rPr lang="en-US" dirty="0" smtClean="0">
-                <a:latin typeface="Oxygen" panose="02000503000000000000" pitchFamily="2" charset="0"/>
-              </a:rPr>
-              <a:t>urriculum</a:t>
-            </a:r>
-          </a:p>
-          <a:p>
-            <a:pPr marL="342900" indent="-342900">
-              <a:lnSpc>
-                <a:spcPct val="200000"/>
-              </a:lnSpc>
-              <a:buFont typeface="Wingdings" panose="05000000000000000000" pitchFamily="2" charset="2"/>
-              <a:buChar char="v"/>
-            </a:pPr>
-            <a:r>
-              <a:rPr lang="en-US" dirty="0" smtClean="0">
-                <a:latin typeface="Oxygen" panose="02000503000000000000" pitchFamily="2" charset="0"/>
-              </a:rPr>
-              <a:t>Contents: Modules &amp; Test Papers (&gt;30%)</a:t>
-            </a:r>
-          </a:p>
-          <a:p>
-            <a:pPr marL="342900" indent="-342900">
-              <a:lnSpc>
-                <a:spcPct val="200000"/>
-              </a:lnSpc>
-              <a:buFont typeface="Wingdings" panose="05000000000000000000" pitchFamily="2" charset="2"/>
-              <a:buChar char="v"/>
-            </a:pPr>
-            <a:r>
-              <a:rPr lang="en-US" dirty="0" smtClean="0">
-                <a:latin typeface="Oxygen" panose="02000503000000000000" pitchFamily="2" charset="0"/>
-              </a:rPr>
-              <a:t>Marketing Strategy &amp; Execution</a:t>
-            </a:r>
-          </a:p>
-          <a:p>
-            <a:pPr marL="342900" indent="-342900">
-              <a:lnSpc>
-                <a:spcPct val="200000"/>
-              </a:lnSpc>
-              <a:buFont typeface="Wingdings" panose="05000000000000000000" pitchFamily="2" charset="2"/>
-              <a:buChar char="v"/>
-            </a:pPr>
-            <a:r>
-              <a:rPr lang="en-US" dirty="0" smtClean="0">
-                <a:latin typeface="Oxygen" panose="02000503000000000000" pitchFamily="2" charset="0"/>
-              </a:rPr>
-              <a:t>Enroll Students &amp; Teach</a:t>
-            </a:r>
-          </a:p>
-          <a:p>
-            <a:pPr marL="342900" indent="-342900">
-              <a:lnSpc>
-                <a:spcPct val="200000"/>
-              </a:lnSpc>
-              <a:buFont typeface="Wingdings" panose="05000000000000000000" pitchFamily="2" charset="2"/>
-              <a:buChar char="v"/>
-            </a:pPr>
-            <a:r>
-              <a:rPr lang="en-US" dirty="0" smtClean="0">
-                <a:latin typeface="Oxygen" panose="02000503000000000000" pitchFamily="2" charset="0"/>
-              </a:rPr>
-              <a:t>Feedback Based QC</a:t>
-            </a:r>
-            <a:endParaRPr lang="en-AU" dirty="0">
-              <a:latin typeface="Oxygen" panose="02000503000000000000" pitchFamily="2" charset="0"/>
-            </a:endParaRPr>
-          </a:p>
-        </p:txBody>
-      </p:sp>
       <p:pic>
         <p:nvPicPr>
           <p:cNvPr id="11" name="Picture 10"/>
@@ -3749,7 +3581,7 @@
           <p:cNvPr id="12" name="Rectangle 11">
             <a:extLst>
               <a:ext uri="{FF2B5EF4-FFF2-40B4-BE49-F238E27FC236}">
-                <a16:creationId xmlns:a16="http://schemas.microsoft.com/office/drawing/2014/main" xmlns="" id="{907BEB2A-D93E-46CB-95DF-04E16F0D1C0C}"/>
+                <a16:creationId xmlns="" xmlns:a16="http://schemas.microsoft.com/office/drawing/2014/main" id="{907BEB2A-D93E-46CB-95DF-04E16F0D1C0C}"/>
               </a:ext>
             </a:extLst>
           </p:cNvPr>
@@ -3819,10 +3651,664 @@
           </a:p>
         </p:txBody>
       </p:sp>
+      <p:sp>
+        <p:nvSpPr>
+          <p:cNvPr id="8" name="TextBox 7"/>
+          <p:cNvSpPr txBox="1"/>
+          <p:nvPr/>
+        </p:nvSpPr>
+        <p:spPr>
+          <a:xfrm>
+            <a:off x="5695707" y="1400909"/>
+            <a:ext cx="5323391" cy="3970318"/>
+          </a:xfrm>
+          <a:prstGeom prst="rect">
+            <a:avLst/>
+          </a:prstGeom>
+          <a:noFill/>
+        </p:spPr>
+        <p:txBody>
+          <a:bodyPr wrap="square" rtlCol="0">
+            <a:spAutoFit/>
+          </a:bodyPr>
+          <a:lstStyle/>
+          <a:p>
+            <a:pPr marL="342900" indent="-342900">
+              <a:lnSpc>
+                <a:spcPct val="200000"/>
+              </a:lnSpc>
+              <a:buFont typeface="Wingdings" panose="05000000000000000000" pitchFamily="2" charset="2"/>
+              <a:buChar char="v"/>
+            </a:pPr>
+            <a:r>
+              <a:rPr lang="en-US" b="1" dirty="0" smtClean="0">
+                <a:solidFill>
+                  <a:srgbClr val="C00000"/>
+                </a:solidFill>
+                <a:latin typeface="Oxygen" panose="02000503000000000000" pitchFamily="2" charset="0"/>
+              </a:rPr>
+              <a:t>Decide Subjects, Boards/Unis, Classes</a:t>
+            </a:r>
+          </a:p>
+          <a:p>
+            <a:pPr marL="342900" indent="-342900">
+              <a:lnSpc>
+                <a:spcPct val="200000"/>
+              </a:lnSpc>
+              <a:buFont typeface="Wingdings" panose="05000000000000000000" pitchFamily="2" charset="2"/>
+              <a:buChar char="v"/>
+            </a:pPr>
+            <a:r>
+              <a:rPr lang="en-US" b="1" dirty="0" smtClean="0">
+                <a:solidFill>
+                  <a:srgbClr val="C00000"/>
+                </a:solidFill>
+                <a:latin typeface="Oxygen" panose="02000503000000000000" pitchFamily="2" charset="0"/>
+              </a:rPr>
+              <a:t>Ensure Core Faculty is Ready</a:t>
+            </a:r>
+          </a:p>
+          <a:p>
+            <a:pPr marL="342900" indent="-342900">
+              <a:lnSpc>
+                <a:spcPct val="200000"/>
+              </a:lnSpc>
+              <a:buFont typeface="Wingdings" panose="05000000000000000000" pitchFamily="2" charset="2"/>
+              <a:buChar char="v"/>
+            </a:pPr>
+            <a:r>
+              <a:rPr lang="en-US" b="1" dirty="0" smtClean="0">
+                <a:solidFill>
+                  <a:srgbClr val="C00000"/>
+                </a:solidFill>
+                <a:latin typeface="Oxygen" panose="02000503000000000000" pitchFamily="2" charset="0"/>
+              </a:rPr>
+              <a:t>Procure Syllabus / Design </a:t>
+            </a:r>
+            <a:r>
+              <a:rPr lang="en-US" b="1" dirty="0">
+                <a:solidFill>
+                  <a:srgbClr val="C00000"/>
+                </a:solidFill>
+                <a:latin typeface="Oxygen" panose="02000503000000000000" pitchFamily="2" charset="0"/>
+              </a:rPr>
+              <a:t>C</a:t>
+            </a:r>
+            <a:r>
+              <a:rPr lang="en-US" b="1" dirty="0" smtClean="0">
+                <a:solidFill>
+                  <a:srgbClr val="C00000"/>
+                </a:solidFill>
+                <a:latin typeface="Oxygen" panose="02000503000000000000" pitchFamily="2" charset="0"/>
+              </a:rPr>
+              <a:t>urriculum</a:t>
+            </a:r>
+          </a:p>
+          <a:p>
+            <a:pPr marL="342900" indent="-342900">
+              <a:lnSpc>
+                <a:spcPct val="200000"/>
+              </a:lnSpc>
+              <a:buFont typeface="Wingdings" panose="05000000000000000000" pitchFamily="2" charset="2"/>
+              <a:buChar char="v"/>
+            </a:pPr>
+            <a:r>
+              <a:rPr lang="en-US" b="1" dirty="0" smtClean="0">
+                <a:solidFill>
+                  <a:srgbClr val="C00000"/>
+                </a:solidFill>
+                <a:latin typeface="Oxygen" panose="02000503000000000000" pitchFamily="2" charset="0"/>
+              </a:rPr>
+              <a:t>Contents: Modules &amp; Test Papers (&gt;30%)</a:t>
+            </a:r>
+          </a:p>
+          <a:p>
+            <a:pPr marL="342900" indent="-342900">
+              <a:lnSpc>
+                <a:spcPct val="200000"/>
+              </a:lnSpc>
+              <a:buFont typeface="Wingdings" panose="05000000000000000000" pitchFamily="2" charset="2"/>
+              <a:buChar char="v"/>
+            </a:pPr>
+            <a:r>
+              <a:rPr lang="en-US" b="1" dirty="0" smtClean="0">
+                <a:solidFill>
+                  <a:srgbClr val="C00000"/>
+                </a:solidFill>
+                <a:latin typeface="Oxygen" panose="02000503000000000000" pitchFamily="2" charset="0"/>
+              </a:rPr>
+              <a:t>Marketing Strategy &amp; Execution</a:t>
+            </a:r>
+          </a:p>
+          <a:p>
+            <a:pPr marL="342900" indent="-342900">
+              <a:lnSpc>
+                <a:spcPct val="200000"/>
+              </a:lnSpc>
+              <a:buFont typeface="Wingdings" panose="05000000000000000000" pitchFamily="2" charset="2"/>
+              <a:buChar char="v"/>
+            </a:pPr>
+            <a:r>
+              <a:rPr lang="en-US" b="1" dirty="0" smtClean="0">
+                <a:solidFill>
+                  <a:srgbClr val="C00000"/>
+                </a:solidFill>
+                <a:latin typeface="Oxygen" panose="02000503000000000000" pitchFamily="2" charset="0"/>
+              </a:rPr>
+              <a:t>Enroll Students &amp; Teach</a:t>
+            </a:r>
+          </a:p>
+          <a:p>
+            <a:pPr marL="342900" indent="-342900">
+              <a:lnSpc>
+                <a:spcPct val="200000"/>
+              </a:lnSpc>
+              <a:buFont typeface="Wingdings" panose="05000000000000000000" pitchFamily="2" charset="2"/>
+              <a:buChar char="v"/>
+            </a:pPr>
+            <a:r>
+              <a:rPr lang="en-US" b="1" dirty="0" smtClean="0">
+                <a:solidFill>
+                  <a:srgbClr val="C00000"/>
+                </a:solidFill>
+                <a:latin typeface="Oxygen" panose="02000503000000000000" pitchFamily="2" charset="0"/>
+              </a:rPr>
+              <a:t>Feedback Based QC</a:t>
+            </a:r>
+            <a:endParaRPr lang="en-AU" b="1" dirty="0">
+              <a:solidFill>
+                <a:srgbClr val="C00000"/>
+              </a:solidFill>
+              <a:latin typeface="Oxygen" panose="02000503000000000000" pitchFamily="2" charset="0"/>
+            </a:endParaRPr>
+          </a:p>
+        </p:txBody>
+      </p:sp>
     </p:spTree>
     <p:extLst>
       <p:ext uri="{BB962C8B-B14F-4D97-AF65-F5344CB8AC3E}">
         <p14:creationId xmlns:p14="http://schemas.microsoft.com/office/powerpoint/2010/main" val="2867139335"/>
+      </p:ext>
+    </p:extLst>
+  </p:cSld>
+  <p:clrMapOvr>
+    <a:masterClrMapping/>
+  </p:clrMapOvr>
+  <p:timing>
+    <p:tnLst>
+      <p:par>
+        <p:cTn id="1" dur="indefinite" restart="never" nodeType="tmRoot"/>
+      </p:par>
+    </p:tnLst>
+  </p:timing>
+</p:sld>
+</file>
+
+<file path=ppt/slides/slide3.xml><?xml version="1.0" encoding="utf-8"?>
+<p:sld xmlns:a="http://schemas.openxmlformats.org/drawingml/2006/main" xmlns:r="http://schemas.openxmlformats.org/officeDocument/2006/relationships" xmlns:p="http://schemas.openxmlformats.org/presentationml/2006/main">
+  <p:cSld>
+    <p:spTree>
+      <p:nvGrpSpPr>
+        <p:cNvPr id="1" name=""/>
+        <p:cNvGrpSpPr/>
+        <p:nvPr/>
+      </p:nvGrpSpPr>
+      <p:grpSpPr>
+        <a:xfrm>
+          <a:off x="0" y="0"/>
+          <a:ext cx="0" cy="0"/>
+          <a:chOff x="0" y="0"/>
+          <a:chExt cx="0" cy="0"/>
+        </a:xfrm>
+      </p:grpSpPr>
+      <p:pic>
+        <p:nvPicPr>
+          <p:cNvPr id="4" name="Picture 3"/>
+          <p:cNvPicPr>
+            <a:picLocks noChangeAspect="1"/>
+          </p:cNvPicPr>
+          <p:nvPr/>
+        </p:nvPicPr>
+        <p:blipFill>
+          <a:blip r:embed="rId2" cstate="print">
+            <a:extLst>
+              <a:ext uri="{28A0092B-C50C-407E-A947-70E740481C1C}">
+                <a14:useLocalDpi xmlns:a14="http://schemas.microsoft.com/office/drawing/2010/main" val="0"/>
+              </a:ext>
+            </a:extLst>
+          </a:blip>
+          <a:stretch>
+            <a:fillRect/>
+          </a:stretch>
+        </p:blipFill>
+        <p:spPr>
+          <a:xfrm>
+            <a:off x="225079" y="6001336"/>
+            <a:ext cx="1486675" cy="703262"/>
+          </a:xfrm>
+          <a:prstGeom prst="rect">
+            <a:avLst/>
+          </a:prstGeom>
+        </p:spPr>
+      </p:pic>
+      <p:sp>
+        <p:nvSpPr>
+          <p:cNvPr id="5" name="TextBox 4"/>
+          <p:cNvSpPr txBox="1"/>
+          <p:nvPr/>
+        </p:nvSpPr>
+        <p:spPr>
+          <a:xfrm>
+            <a:off x="5312779" y="6503438"/>
+            <a:ext cx="2928395" cy="261610"/>
+          </a:xfrm>
+          <a:prstGeom prst="rect">
+            <a:avLst/>
+          </a:prstGeom>
+          <a:noFill/>
+        </p:spPr>
+        <p:txBody>
+          <a:bodyPr wrap="square" rtlCol="0">
+            <a:spAutoFit/>
+          </a:bodyPr>
+          <a:lstStyle/>
+          <a:p>
+            <a:pPr algn="ctr"/>
+            <a:r>
+              <a:rPr lang="en-US" sz="1100" b="1" dirty="0" smtClean="0">
+                <a:solidFill>
+                  <a:srgbClr val="FF8C52"/>
+                </a:solidFill>
+                <a:latin typeface="Oxygen" panose="02000503000000000000" pitchFamily="2" charset="0"/>
+              </a:rPr>
+              <a:t>Private and Confidential ® © 2023</a:t>
+            </a:r>
+            <a:endParaRPr lang="en-AU" sz="1100" b="1" dirty="0">
+              <a:solidFill>
+                <a:srgbClr val="FF8C52"/>
+              </a:solidFill>
+              <a:latin typeface="Oxygen" panose="02000503000000000000" pitchFamily="2" charset="0"/>
+            </a:endParaRPr>
+          </a:p>
+        </p:txBody>
+      </p:sp>
+      <p:sp>
+        <p:nvSpPr>
+          <p:cNvPr id="6" name="TextBox 5"/>
+          <p:cNvSpPr txBox="1"/>
+          <p:nvPr/>
+        </p:nvSpPr>
+        <p:spPr>
+          <a:xfrm>
+            <a:off x="2733553" y="220314"/>
+            <a:ext cx="6966031" cy="584775"/>
+          </a:xfrm>
+          <a:prstGeom prst="rect">
+            <a:avLst/>
+          </a:prstGeom>
+          <a:noFill/>
+        </p:spPr>
+        <p:txBody>
+          <a:bodyPr wrap="square" rtlCol="0">
+            <a:spAutoFit/>
+          </a:bodyPr>
+          <a:lstStyle/>
+          <a:p>
+            <a:pPr algn="ctr"/>
+            <a:r>
+              <a:rPr lang="en-US" sz="3200" b="1" dirty="0" smtClean="0">
+                <a:solidFill>
+                  <a:srgbClr val="FF8C52"/>
+                </a:solidFill>
+                <a:latin typeface="Oxygen" panose="02000503000000000000" pitchFamily="2" charset="0"/>
+              </a:rPr>
+              <a:t>Handpicking Our Faculty</a:t>
+            </a:r>
+            <a:endParaRPr lang="en-AU" sz="3200" b="1" dirty="0">
+              <a:solidFill>
+                <a:srgbClr val="FF8C52"/>
+              </a:solidFill>
+              <a:latin typeface="Oxygen" panose="02000503000000000000" pitchFamily="2" charset="0"/>
+            </a:endParaRPr>
+          </a:p>
+        </p:txBody>
+      </p:sp>
+      <p:pic>
+        <p:nvPicPr>
+          <p:cNvPr id="2" name="Picture 1"/>
+          <p:cNvPicPr>
+            <a:picLocks noChangeAspect="1"/>
+          </p:cNvPicPr>
+          <p:nvPr/>
+        </p:nvPicPr>
+        <p:blipFill>
+          <a:blip r:embed="rId3"/>
+          <a:stretch>
+            <a:fillRect/>
+          </a:stretch>
+        </p:blipFill>
+        <p:spPr>
+          <a:xfrm>
+            <a:off x="968421" y="2101169"/>
+            <a:ext cx="3000375" cy="3000375"/>
+          </a:xfrm>
+          <a:prstGeom prst="rect">
+            <a:avLst/>
+          </a:prstGeom>
+        </p:spPr>
+      </p:pic>
+      <p:sp>
+        <p:nvSpPr>
+          <p:cNvPr id="12" name="Rectangle 11">
+            <a:extLst>
+              <a:ext uri="{FF2B5EF4-FFF2-40B4-BE49-F238E27FC236}">
+                <a16:creationId xmlns="" xmlns:a16="http://schemas.microsoft.com/office/drawing/2014/main" id="{907BEB2A-D93E-46CB-95DF-04E16F0D1C0C}"/>
+              </a:ext>
+            </a:extLst>
+          </p:cNvPr>
+          <p:cNvSpPr/>
+          <p:nvPr/>
+        </p:nvSpPr>
+        <p:spPr>
+          <a:xfrm>
+            <a:off x="956212" y="2099720"/>
+            <a:ext cx="3012584" cy="3001824"/>
+          </a:xfrm>
+          <a:prstGeom prst="rect">
+            <a:avLst/>
+          </a:prstGeom>
+          <a:gradFill flip="none" rotWithShape="1">
+            <a:gsLst>
+              <a:gs pos="0">
+                <a:srgbClr val="FFFFFF">
+                  <a:alpha val="0"/>
+                </a:srgbClr>
+              </a:gs>
+              <a:gs pos="59000">
+                <a:srgbClr val="FFFFFF">
+                  <a:alpha val="0"/>
+                </a:srgbClr>
+              </a:gs>
+              <a:gs pos="71000">
+                <a:schemeClr val="bg1"/>
+              </a:gs>
+              <a:gs pos="100000">
+                <a:schemeClr val="bg1"/>
+              </a:gs>
+            </a:gsLst>
+            <a:path path="circle">
+              <a:fillToRect l="50000" t="50000" r="50000" b="50000"/>
+            </a:path>
+            <a:tileRect/>
+          </a:gradFill>
+          <a:ln>
+            <a:noFill/>
+          </a:ln>
+        </p:spPr>
+        <p:style>
+          <a:lnRef idx="2">
+            <a:schemeClr val="accent1">
+              <a:shade val="50000"/>
+            </a:schemeClr>
+          </a:lnRef>
+          <a:fillRef idx="1">
+            <a:schemeClr val="accent1"/>
+          </a:fillRef>
+          <a:effectRef idx="0">
+            <a:schemeClr val="accent1"/>
+          </a:effectRef>
+          <a:fontRef idx="minor">
+            <a:schemeClr val="lt1"/>
+          </a:fontRef>
+        </p:style>
+        <p:txBody>
+          <a:bodyPr rtlCol="0" anchor="ctr"/>
+          <a:lstStyle/>
+          <a:p>
+            <a:pPr algn="ctr"/>
+            <a:endParaRPr lang="en-AU">
+              <a:latin typeface="Oxygen" panose="02000503000000000000" pitchFamily="2" charset="0"/>
+            </a:endParaRPr>
+          </a:p>
+        </p:txBody>
+      </p:sp>
+      <p:sp>
+        <p:nvSpPr>
+          <p:cNvPr id="10" name="TextBox 9"/>
+          <p:cNvSpPr txBox="1"/>
+          <p:nvPr/>
+        </p:nvSpPr>
+        <p:spPr>
+          <a:xfrm>
+            <a:off x="4479555" y="1547213"/>
+            <a:ext cx="6877293" cy="4031873"/>
+          </a:xfrm>
+          <a:prstGeom prst="rect">
+            <a:avLst/>
+          </a:prstGeom>
+          <a:noFill/>
+        </p:spPr>
+        <p:txBody>
+          <a:bodyPr wrap="square" rtlCol="0">
+            <a:spAutoFit/>
+          </a:bodyPr>
+          <a:lstStyle/>
+          <a:p>
+            <a:pPr marL="342900" indent="-342900">
+              <a:lnSpc>
+                <a:spcPct val="200000"/>
+              </a:lnSpc>
+              <a:buFont typeface="+mj-lt"/>
+              <a:buAutoNum type="arabicPeriod"/>
+            </a:pPr>
+            <a:r>
+              <a:rPr lang="en-US" sz="1600" b="1" dirty="0" smtClean="0">
+                <a:solidFill>
+                  <a:srgbClr val="C00000"/>
+                </a:solidFill>
+                <a:latin typeface="Oxygen" panose="02000503000000000000" pitchFamily="2" charset="0"/>
+              </a:rPr>
+              <a:t>Vacancy Analysis &amp; Contact Faculty</a:t>
+            </a:r>
+          </a:p>
+          <a:p>
+            <a:pPr marL="342900" indent="-342900">
+              <a:lnSpc>
+                <a:spcPct val="200000"/>
+              </a:lnSpc>
+              <a:buFont typeface="+mj-lt"/>
+              <a:buAutoNum type="arabicPeriod"/>
+            </a:pPr>
+            <a:r>
+              <a:rPr lang="en-US" sz="1600" b="1" dirty="0" smtClean="0">
+                <a:solidFill>
+                  <a:srgbClr val="C00000"/>
+                </a:solidFill>
+                <a:latin typeface="Oxygen" panose="02000503000000000000" pitchFamily="2" charset="0"/>
+              </a:rPr>
+              <a:t>Interview &amp; Onboarding Form Fill-up</a:t>
+            </a:r>
+          </a:p>
+          <a:p>
+            <a:pPr marL="342900" indent="-342900">
+              <a:lnSpc>
+                <a:spcPct val="200000"/>
+              </a:lnSpc>
+              <a:buFont typeface="+mj-lt"/>
+              <a:buAutoNum type="arabicPeriod"/>
+            </a:pPr>
+            <a:r>
+              <a:rPr lang="en-US" sz="1600" b="1" dirty="0" smtClean="0">
+                <a:solidFill>
+                  <a:srgbClr val="C00000"/>
+                </a:solidFill>
+                <a:latin typeface="Oxygen" panose="02000503000000000000" pitchFamily="2" charset="0"/>
+              </a:rPr>
+              <a:t>Collect Complete Data &amp; Create </a:t>
+            </a:r>
+            <a:r>
+              <a:rPr lang="en-US" sz="1600" b="1" dirty="0">
+                <a:solidFill>
+                  <a:srgbClr val="C00000"/>
+                </a:solidFill>
+                <a:latin typeface="Oxygen" panose="02000503000000000000" pitchFamily="2" charset="0"/>
+              </a:rPr>
+              <a:t>Profile </a:t>
+            </a:r>
+            <a:r>
+              <a:rPr lang="en-US" sz="1600" b="1" dirty="0" smtClean="0">
+                <a:solidFill>
+                  <a:srgbClr val="C00000"/>
+                </a:solidFill>
+                <a:latin typeface="Oxygen" panose="02000503000000000000" pitchFamily="2" charset="0"/>
+              </a:rPr>
+              <a:t>(.pptx, .xlsx)</a:t>
+            </a:r>
+          </a:p>
+          <a:p>
+            <a:pPr marL="342900" indent="-342900">
+              <a:lnSpc>
+                <a:spcPct val="200000"/>
+              </a:lnSpc>
+              <a:buFont typeface="+mj-lt"/>
+              <a:buAutoNum type="arabicPeriod"/>
+            </a:pPr>
+            <a:r>
+              <a:rPr lang="en-US" sz="1600" b="1" dirty="0">
+                <a:solidFill>
+                  <a:srgbClr val="C00000"/>
+                </a:solidFill>
+                <a:latin typeface="Oxygen" panose="02000503000000000000" pitchFamily="2" charset="0"/>
+              </a:rPr>
+              <a:t>Calculate Profitability (Sales Offers V/s Faculty Accepted Payout)</a:t>
+            </a:r>
+          </a:p>
+          <a:p>
+            <a:pPr marL="342900" indent="-342900">
+              <a:lnSpc>
+                <a:spcPct val="200000"/>
+              </a:lnSpc>
+              <a:buFont typeface="+mj-lt"/>
+              <a:buAutoNum type="arabicPeriod"/>
+            </a:pPr>
+            <a:r>
+              <a:rPr lang="en-US" sz="1600" b="1" dirty="0" smtClean="0">
+                <a:solidFill>
+                  <a:srgbClr val="C00000"/>
+                </a:solidFill>
+                <a:latin typeface="Oxygen" panose="02000503000000000000" pitchFamily="2" charset="0"/>
+              </a:rPr>
+              <a:t>Fix </a:t>
+            </a:r>
+            <a:r>
+              <a:rPr lang="en-US" sz="1600" b="1" dirty="0">
+                <a:solidFill>
+                  <a:srgbClr val="C00000"/>
+                </a:solidFill>
+                <a:latin typeface="Oxygen" panose="02000503000000000000" pitchFamily="2" charset="0"/>
+              </a:rPr>
+              <a:t>Class </a:t>
+            </a:r>
+            <a:r>
+              <a:rPr lang="en-US" sz="1600" b="1" dirty="0" smtClean="0">
+                <a:solidFill>
+                  <a:srgbClr val="C00000"/>
+                </a:solidFill>
+                <a:latin typeface="Oxygen" panose="02000503000000000000" pitchFamily="2" charset="0"/>
+              </a:rPr>
+              <a:t>Duration, Frequency, Day of Week &amp; Timing</a:t>
+            </a:r>
+            <a:endParaRPr lang="en-US" sz="1600" b="1" dirty="0">
+              <a:solidFill>
+                <a:srgbClr val="C00000"/>
+              </a:solidFill>
+              <a:latin typeface="Oxygen" panose="02000503000000000000" pitchFamily="2" charset="0"/>
+            </a:endParaRPr>
+          </a:p>
+          <a:p>
+            <a:pPr marL="342900" indent="-342900">
+              <a:lnSpc>
+                <a:spcPct val="200000"/>
+              </a:lnSpc>
+              <a:buFont typeface="+mj-lt"/>
+              <a:buAutoNum type="arabicPeriod"/>
+            </a:pPr>
+            <a:r>
+              <a:rPr lang="en-US" sz="1600" b="1" dirty="0">
+                <a:solidFill>
+                  <a:srgbClr val="C00000"/>
+                </a:solidFill>
+                <a:latin typeface="Oxygen" panose="02000503000000000000" pitchFamily="2" charset="0"/>
+              </a:rPr>
+              <a:t>Fix Class Start </a:t>
+            </a:r>
+            <a:r>
+              <a:rPr lang="en-US" sz="1600" b="1" dirty="0" smtClean="0">
+                <a:solidFill>
+                  <a:srgbClr val="C00000"/>
+                </a:solidFill>
+                <a:latin typeface="Oxygen" panose="02000503000000000000" pitchFamily="2" charset="0"/>
+              </a:rPr>
+              <a:t>Date &amp; Book a Class Room with Adequate Facilities</a:t>
+            </a:r>
+            <a:endParaRPr lang="en-US" sz="1600" b="1" dirty="0">
+              <a:solidFill>
+                <a:srgbClr val="C00000"/>
+              </a:solidFill>
+              <a:latin typeface="Oxygen" panose="02000503000000000000" pitchFamily="2" charset="0"/>
+            </a:endParaRPr>
+          </a:p>
+          <a:p>
+            <a:pPr marL="342900" indent="-342900">
+              <a:lnSpc>
+                <a:spcPct val="200000"/>
+              </a:lnSpc>
+              <a:buFont typeface="+mj-lt"/>
+              <a:buAutoNum type="arabicPeriod"/>
+            </a:pPr>
+            <a:r>
+              <a:rPr lang="en-US" sz="1600" b="1" dirty="0" smtClean="0">
+                <a:solidFill>
+                  <a:srgbClr val="C00000"/>
+                </a:solidFill>
+                <a:latin typeface="Oxygen" panose="02000503000000000000" pitchFamily="2" charset="0"/>
+              </a:rPr>
+              <a:t>Create Online/Offline Ads &amp; Get Faculty &amp; Management Approval</a:t>
+            </a:r>
+          </a:p>
+          <a:p>
+            <a:pPr marL="342900" indent="-342900">
+              <a:lnSpc>
+                <a:spcPct val="200000"/>
+              </a:lnSpc>
+              <a:buFont typeface="+mj-lt"/>
+              <a:buAutoNum type="arabicPeriod"/>
+            </a:pPr>
+            <a:r>
+              <a:rPr lang="en-US" sz="1600" b="1" dirty="0">
+                <a:solidFill>
+                  <a:srgbClr val="C00000"/>
+                </a:solidFill>
+                <a:latin typeface="Oxygen" panose="02000503000000000000" pitchFamily="2" charset="0"/>
+              </a:rPr>
+              <a:t>Start </a:t>
+            </a:r>
+            <a:r>
+              <a:rPr lang="en-US" sz="1600" b="1" dirty="0" smtClean="0">
+                <a:solidFill>
+                  <a:srgbClr val="C00000"/>
+                </a:solidFill>
+                <a:latin typeface="Oxygen" panose="02000503000000000000" pitchFamily="2" charset="0"/>
+              </a:rPr>
+              <a:t>Marketing: Online /Offline</a:t>
+            </a:r>
+          </a:p>
+        </p:txBody>
+      </p:sp>
+    </p:spTree>
+    <p:extLst>
+      <p:ext uri="{BB962C8B-B14F-4D97-AF65-F5344CB8AC3E}">
+        <p14:creationId xmlns:p14="http://schemas.microsoft.com/office/powerpoint/2010/main" val="566584680"/>
       </p:ext>
     </p:extLst>
   </p:cSld>

</xml_diff>